<commit_message>
Fixing some minor mistakes in the slides and 2 execution scripts
</commit_message>
<xml_diff>
--- a/day1/slides/00_Intro.pptx
+++ b/day1/slides/00_Intro.pptx
@@ -5223,7 +5223,7 @@
                 <a:cs typeface="Calibri"/>
                 <a:sym typeface="Calibri"/>
               </a:rPr>
-              <a:t>Leskosec</a:t>
+              <a:t>Leskosek</a:t>
             </a:r>
             <a:r>
               <a:rPr lang="en-US" sz="2400" b="0" i="1" u="none" strike="noStrike" cap="none" dirty="0" smtClean="0">
@@ -7954,15 +7954,7 @@
                   <a:srgbClr val="2F5897"/>
                 </a:solidFill>
               </a:rPr>
-              <a:t>Login node: </a:t>
-            </a:r>
-            <a:r>
-              <a:rPr lang="en-GB" sz="2000" dirty="0" smtClean="0">
-                <a:solidFill>
-                  <a:srgbClr val="2F5897"/>
-                </a:solidFill>
-              </a:rPr>
-              <a:t>osolnik.arnes.si</a:t>
+              <a:t>Login node: osolnik.arnes.si</a:t>
             </a:r>
           </a:p>
           <a:p>
@@ -7988,11 +7980,6 @@
               </a:rPr>
               <a:t>3 nodes:</a:t>
             </a:r>
-            <a:endParaRPr lang="en-GB" sz="2000" dirty="0" smtClean="0">
-              <a:solidFill>
-                <a:srgbClr val="2F5897"/>
-              </a:solidFill>
-            </a:endParaRPr>
           </a:p>
           <a:p>
             <a:pPr marL="857250" lvl="1" indent="-355600">

</xml_diff>